<commit_message>
Update UML in ppt
</commit_message>
<xml_diff>
--- a/7. Group Project/W6D5_Project/Powerpoint/Watch Me Whip.pptx
+++ b/7. Group Project/W6D5_Project/Powerpoint/Watch Me Whip.pptx
@@ -5,7 +5,7 @@
     <p:sldMasterId id="2147483888" r:id="rId1"/>
   </p:sldMasterIdLst>
   <p:notesMasterIdLst>
-    <p:notesMasterId r:id="rId15"/>
+    <p:notesMasterId r:id="rId16"/>
   </p:notesMasterIdLst>
   <p:sldIdLst>
     <p:sldId id="256" r:id="rId2"/>
@@ -18,9 +18,10 @@
     <p:sldId id="257" r:id="rId9"/>
     <p:sldId id="268" r:id="rId10"/>
     <p:sldId id="261" r:id="rId11"/>
-    <p:sldId id="269" r:id="rId12"/>
-    <p:sldId id="262" r:id="rId13"/>
-    <p:sldId id="264" r:id="rId14"/>
+    <p:sldId id="272" r:id="rId12"/>
+    <p:sldId id="270" r:id="rId13"/>
+    <p:sldId id="262" r:id="rId14"/>
+    <p:sldId id="264" r:id="rId15"/>
   </p:sldIdLst>
   <p:sldSz cx="9144000" cy="6858000" type="screen4x3"/>
   <p:notesSz cx="6858000" cy="9144000"/>
@@ -539,7 +540,7 @@
             <a:fld id="{FEEAFB3B-9D53-438A-B3E3-F4DAB65D212A}" type="slidenum">
               <a:rPr lang="en-US" smtClean="0"/>
               <a:pPr/>
-              <a:t>13</a:t>
+              <a:t>14</a:t>
             </a:fld>
             <a:endParaRPr lang="en-US"/>
           </a:p>
@@ -6789,7 +6790,7 @@
       </p:sp>
       <p:pic>
         <p:nvPicPr>
-          <p:cNvPr id="4" name="Picture 3" descr="W6D5_SEQUENCEDIAGRAM.jpg"/>
+          <p:cNvPr id="4" name="Picture 3" descr="W6D5_CLASSDIAGRAM.jpg"/>
           <p:cNvPicPr>
             <a:picLocks noChangeAspect="1"/>
           </p:cNvPicPr>
@@ -6803,8 +6804,8 @@
         </p:blipFill>
         <p:spPr>
           <a:xfrm>
-            <a:off x="228600" y="1600200"/>
-            <a:ext cx="8686800" cy="4724400"/>
+            <a:off x="228600" y="1586700"/>
+            <a:ext cx="8686800" cy="4737900"/>
           </a:xfrm>
           <a:prstGeom prst="rect">
             <a:avLst/>
@@ -6853,6 +6854,110 @@
           <a:p>
             <a:r>
               <a:rPr lang="en-US" dirty="0" smtClean="0"/>
+              <a:t>UML Diagram</a:t>
+            </a:r>
+            <a:endParaRPr lang="en-US" dirty="0"/>
+          </a:p>
+        </p:txBody>
+      </p:sp>
+      <p:sp>
+        <p:nvSpPr>
+          <p:cNvPr id="5" name="Text Placeholder 4"/>
+          <p:cNvSpPr>
+            <a:spLocks noGrp="1"/>
+          </p:cNvSpPr>
+          <p:nvPr>
+            <p:ph type="body" idx="2"/>
+          </p:nvPr>
+        </p:nvSpPr>
+        <p:spPr/>
+        <p:txBody>
+          <a:bodyPr/>
+          <a:lstStyle/>
+          <a:p>
+            <a:r>
+              <a:rPr lang="en-US" dirty="0" smtClean="0"/>
+              <a:t>Sequence Diagram</a:t>
+            </a:r>
+          </a:p>
+          <a:p>
+            <a:endParaRPr lang="en-US" dirty="0"/>
+          </a:p>
+        </p:txBody>
+      </p:sp>
+      <p:pic>
+        <p:nvPicPr>
+          <p:cNvPr id="6" name="Picture 5" descr="W6D5_SEQUENCEDIAGRAM.jpg"/>
+          <p:cNvPicPr>
+            <a:picLocks noChangeAspect="1"/>
+          </p:cNvPicPr>
+          <p:nvPr/>
+        </p:nvPicPr>
+        <p:blipFill>
+          <a:blip r:embed="rId2" cstate="print"/>
+          <a:stretch>
+            <a:fillRect/>
+          </a:stretch>
+        </p:blipFill>
+        <p:spPr>
+          <a:xfrm>
+            <a:off x="2590800" y="609600"/>
+            <a:ext cx="6400800" cy="5791200"/>
+          </a:xfrm>
+          <a:prstGeom prst="rect">
+            <a:avLst/>
+          </a:prstGeom>
+        </p:spPr>
+      </p:pic>
+    </p:spTree>
+  </p:cSld>
+  <p:clrMapOvr>
+    <a:masterClrMapping/>
+  </p:clrMapOvr>
+  <p:timing>
+    <p:tnLst>
+      <p:par>
+        <p:cTn id="1" dur="indefinite" restart="never" nodeType="tmRoot"/>
+      </p:par>
+    </p:tnLst>
+  </p:timing>
+</p:sld>
+</file>
+
+<file path=ppt/slides/slide13.xml><?xml version="1.0" encoding="utf-8"?>
+<p:sld xmlns:a="http://schemas.openxmlformats.org/drawingml/2006/main" xmlns:r="http://schemas.openxmlformats.org/officeDocument/2006/relationships" xmlns:p="http://schemas.openxmlformats.org/presentationml/2006/main">
+  <p:cSld>
+    <p:spTree>
+      <p:nvGrpSpPr>
+        <p:cNvPr id="1" name=""/>
+        <p:cNvGrpSpPr/>
+        <p:nvPr/>
+      </p:nvGrpSpPr>
+      <p:grpSpPr>
+        <a:xfrm>
+          <a:off x="0" y="0"/>
+          <a:ext cx="0" cy="0"/>
+          <a:chOff x="0" y="0"/>
+          <a:chExt cx="0" cy="0"/>
+        </a:xfrm>
+      </p:grpSpPr>
+      <p:sp>
+        <p:nvSpPr>
+          <p:cNvPr id="2" name="Title 1"/>
+          <p:cNvSpPr>
+            <a:spLocks noGrp="1"/>
+          </p:cNvSpPr>
+          <p:nvPr>
+            <p:ph type="title"/>
+          </p:nvPr>
+        </p:nvSpPr>
+        <p:spPr/>
+        <p:txBody>
+          <a:bodyPr/>
+          <a:lstStyle/>
+          <a:p>
+            <a:r>
+              <a:rPr lang="en-US" dirty="0" smtClean="0"/>
               <a:t>Detailed Functions Per User</a:t>
             </a:r>
             <a:endParaRPr lang="en-US" dirty="0"/>
@@ -6978,7 +7083,7 @@
 </p:sld>
 </file>
 
-<file path=ppt/slides/slide13.xml><?xml version="1.0" encoding="utf-8"?>
+<file path=ppt/slides/slide14.xml><?xml version="1.0" encoding="utf-8"?>
 <p:sld xmlns:a="http://schemas.openxmlformats.org/drawingml/2006/main" xmlns:r="http://schemas.openxmlformats.org/officeDocument/2006/relationships" xmlns:p="http://schemas.openxmlformats.org/presentationml/2006/main">
   <p:cSld>
     <p:spTree>

</xml_diff>